<commit_message>
Update documentation and presentation
</commit_message>
<xml_diff>
--- a/Documents/Project Presentation.pptx
+++ b/Documents/Project Presentation.pptx
@@ -2650,7 +2650,7 @@
           </p:cNvPicPr>
           <p:nvPr/>
         </p:nvPicPr>
-        <p:blipFill>
+        <p:blipFill rotWithShape="1">
           <a:blip r:embed="rId2">
             <a:extLst>
               <a:ext uri="{28A0092B-C50C-407E-A947-70E740481C1C}">
@@ -2658,14 +2658,13 @@
               </a:ext>
             </a:extLst>
           </a:blip>
-          <a:stretch>
-            <a:fillRect/>
-          </a:stretch>
+          <a:srcRect r="2682"/>
+          <a:stretch/>
         </p:blipFill>
         <p:spPr>
           <a:xfrm>
-            <a:off x="1371600" y="1524000"/>
-            <a:ext cx="4854575" cy="5029200"/>
+            <a:off x="1371601" y="1524000"/>
+            <a:ext cx="4724400" cy="5029200"/>
           </a:xfrm>
           <a:prstGeom prst="rect">
             <a:avLst/>

</xml_diff>

<commit_message>
Update presentation and update logo
</commit_message>
<xml_diff>
--- a/Documents/Project Presentation.pptx
+++ b/Documents/Project Presentation.pptx
@@ -1670,6 +1670,10 @@
           </p:nvPr>
         </p:nvSpPr>
         <p:spPr>
+          <a:xfrm>
+            <a:off x="578427" y="2590800"/>
+            <a:ext cx="7093204" cy="1123314"/>
+          </a:xfrm>
           <a:prstGeom prst="rect">
             <a:avLst/>
           </a:prstGeom>
@@ -1716,7 +1720,7 @@
         </p:nvSpPr>
         <p:spPr>
           <a:xfrm>
-            <a:off x="4343400" y="3827601"/>
+            <a:off x="1512478" y="3829050"/>
             <a:ext cx="2205736" cy="382156"/>
           </a:xfrm>
           <a:prstGeom prst="rect">
@@ -1754,6 +1758,42 @@
           </a:p>
         </p:txBody>
       </p:sp>
+      <p:pic>
+        <p:nvPicPr>
+          <p:cNvPr id="5" name="Picture 4" descr="A picture containing text&#10;&#10;Description automatically generated">
+            <a:extLst>
+              <a:ext uri="{FF2B5EF4-FFF2-40B4-BE49-F238E27FC236}">
+                <a16:creationId xmlns:a16="http://schemas.microsoft.com/office/drawing/2014/main" id="{17639519-6212-4546-B514-A5EF784709BB}"/>
+              </a:ext>
+            </a:extLst>
+          </p:cNvPr>
+          <p:cNvPicPr>
+            <a:picLocks noChangeAspect="1"/>
+          </p:cNvPicPr>
+          <p:nvPr/>
+        </p:nvPicPr>
+        <p:blipFill>
+          <a:blip r:embed="rId2">
+            <a:extLst>
+              <a:ext uri="{28A0092B-C50C-407E-A947-70E740481C1C}">
+                <a14:useLocalDpi xmlns:a14="http://schemas.microsoft.com/office/drawing/2010/main" val="0"/>
+              </a:ext>
+            </a:extLst>
+          </a:blip>
+          <a:stretch>
+            <a:fillRect/>
+          </a:stretch>
+        </p:blipFill>
+        <p:spPr>
+          <a:xfrm>
+            <a:off x="6858000" y="1447800"/>
+            <a:ext cx="4762500" cy="4762500"/>
+          </a:xfrm>
+          <a:prstGeom prst="rect">
+            <a:avLst/>
+          </a:prstGeom>
+        </p:spPr>
+      </p:pic>
     </p:spTree>
   </p:cSld>
   <p:clrMapOvr>

</xml_diff>